<commit_message>
add diagram into slide
</commit_message>
<xml_diff>
--- a/References/RUSH GAME.pptx
+++ b/References/RUSH GAME.pptx
@@ -207,7 +207,7 @@
           <a:p>
             <a:fld id="{724965C3-076B-A244-A620-DC46E76EC79B}" type="datetimeFigureOut">
               <a:rPr lang="en-US" smtClean="0"/>
-              <a:t>12/20/13</a:t>
+              <a:t>12/20/2013</a:t>
             </a:fld>
             <a:endParaRPr lang="en-US"/>
           </a:p>
@@ -373,7 +373,7 @@
           <a:p>
             <a:fld id="{2A2D8A15-967E-3F47-A604-21DE9A86FC0A}" type="datetimeFigureOut">
               <a:rPr lang="en-US" smtClean="0"/>
-              <a:t>12/20/13</a:t>
+              <a:t>12/20/2013</a:t>
             </a:fld>
             <a:endParaRPr lang="en-US"/>
           </a:p>
@@ -843,7 +843,7 @@
           <a:p>
             <a:fld id="{489FB7FF-FAA2-6E4C-9C7F-18727B505041}" type="datetime1">
               <a:rPr lang="en-US" smtClean="0"/>
-              <a:t>12/20/13</a:t>
+              <a:t>12/20/2013</a:t>
             </a:fld>
             <a:endParaRPr lang="en-US"/>
           </a:p>
@@ -1189,7 +1189,7 @@
   <p:clrMapOvr>
     <a:masterClrMapping/>
   </p:clrMapOvr>
-  <p:transition xmlns:p14="http://schemas.microsoft.com/office/powerpoint/2010/main" spd="slow">
+  <p:transition spd="slow">
     <p:cover/>
   </p:transition>
 </p:sldLayout>
@@ -1334,7 +1334,7 @@
           <a:p>
             <a:fld id="{40787C8A-77B0-7240-87C3-DDCFD70E38DE}" type="datetime1">
               <a:rPr lang="en-US" smtClean="0"/>
-              <a:t>12/20/13</a:t>
+              <a:t>12/20/2013</a:t>
             </a:fld>
             <a:endParaRPr lang="en-US"/>
           </a:p>
@@ -1739,7 +1739,7 @@
   <p:clrMapOvr>
     <a:masterClrMapping/>
   </p:clrMapOvr>
-  <p:transition xmlns:p14="http://schemas.microsoft.com/office/powerpoint/2010/main" spd="slow">
+  <p:transition spd="slow">
     <p:cover/>
   </p:transition>
 </p:sldLayout>
@@ -1884,7 +1884,7 @@
           <a:p>
             <a:fld id="{AE468B07-2834-D44B-92D6-133E608A3FCF}" type="datetime1">
               <a:rPr lang="en-US" smtClean="0"/>
-              <a:t>12/20/13</a:t>
+              <a:t>12/20/2013</a:t>
             </a:fld>
             <a:endParaRPr lang="en-US"/>
           </a:p>
@@ -1941,7 +1941,7 @@
   <p:clrMapOvr>
     <a:masterClrMapping/>
   </p:clrMapOvr>
-  <p:transition xmlns:p14="http://schemas.microsoft.com/office/powerpoint/2010/main" spd="slow">
+  <p:transition spd="slow">
     <p:cover/>
   </p:transition>
 </p:sldLayout>
@@ -2027,7 +2027,7 @@
           <a:p>
             <a:fld id="{09BAA3C3-9EAF-A746-A15B-7486712F861F}" type="datetime1">
               <a:rPr lang="en-US" smtClean="0"/>
-              <a:t>12/20/13</a:t>
+              <a:t>12/20/2013</a:t>
             </a:fld>
             <a:endParaRPr lang="en-US"/>
           </a:p>
@@ -2084,7 +2084,7 @@
   <p:clrMapOvr>
     <a:masterClrMapping/>
   </p:clrMapOvr>
-  <p:transition xmlns:p14="http://schemas.microsoft.com/office/powerpoint/2010/main" spd="slow">
+  <p:transition spd="slow">
     <p:cover/>
   </p:transition>
 </p:sldLayout>
@@ -2372,7 +2372,7 @@
           <a:p>
             <a:fld id="{B5EF7D23-A3E8-3F4C-9A4A-F6D51CEF3D5E}" type="datetime1">
               <a:rPr lang="en-US" smtClean="0"/>
-              <a:t>12/20/13</a:t>
+              <a:t>12/20/2013</a:t>
             </a:fld>
             <a:endParaRPr lang="en-US"/>
           </a:p>
@@ -2447,7 +2447,7 @@
   <p:clrMapOvr>
     <a:masterClrMapping/>
   </p:clrMapOvr>
-  <p:transition xmlns:p14="http://schemas.microsoft.com/office/powerpoint/2010/main" spd="slow">
+  <p:transition spd="slow">
     <p:cover/>
   </p:transition>
 </p:sldLayout>
@@ -2705,7 +2705,7 @@
           <a:p>
             <a:fld id="{D556EF55-DFE7-8C49-8B9C-77884C4FC171}" type="datetime1">
               <a:rPr lang="en-US" smtClean="0"/>
-              <a:t>12/20/13</a:t>
+              <a:t>12/20/2013</a:t>
             </a:fld>
             <a:endParaRPr lang="en-US"/>
           </a:p>
@@ -2803,7 +2803,7 @@
   <p:clrMapOvr>
     <a:masterClrMapping/>
   </p:clrMapOvr>
-  <p:transition xmlns:p14="http://schemas.microsoft.com/office/powerpoint/2010/main" spd="slow">
+  <p:transition spd="slow">
     <p:cover/>
   </p:transition>
 </p:sldLayout>
@@ -3010,7 +3010,7 @@
           <a:p>
             <a:fld id="{1F940638-6638-E442-A9BC-AC2B7A33D626}" type="datetime1">
               <a:rPr lang="en-US" smtClean="0"/>
-              <a:t>12/20/13</a:t>
+              <a:t>12/20/2013</a:t>
             </a:fld>
             <a:endParaRPr lang="en-US"/>
           </a:p>
@@ -3195,7 +3195,7 @@
   <p:clrMapOvr>
     <a:masterClrMapping/>
   </p:clrMapOvr>
-  <p:transition xmlns:p14="http://schemas.microsoft.com/office/powerpoint/2010/main" spd="slow">
+  <p:transition spd="slow">
     <p:cover/>
   </p:transition>
 </p:sldLayout>
@@ -3404,7 +3404,7 @@
           <a:p>
             <a:fld id="{D6F61525-6F14-2F47-A0CC-7A6C55EE6E49}" type="datetime1">
               <a:rPr lang="en-US" smtClean="0"/>
-              <a:t>12/20/13</a:t>
+              <a:t>12/20/2013</a:t>
             </a:fld>
             <a:endParaRPr lang="en-US"/>
           </a:p>
@@ -3622,7 +3622,7 @@
   <p:clrMapOvr>
     <a:masterClrMapping/>
   </p:clrMapOvr>
-  <p:transition xmlns:p14="http://schemas.microsoft.com/office/powerpoint/2010/main" spd="slow">
+  <p:transition spd="slow">
     <p:cover/>
   </p:transition>
 </p:sldLayout>
@@ -3831,7 +3831,7 @@
           <a:p>
             <a:fld id="{AB29E9D0-E904-0B4D-A372-D3F269D2A7A8}" type="datetime1">
               <a:rPr lang="en-US" smtClean="0"/>
-              <a:t>12/20/13</a:t>
+              <a:t>12/20/2013</a:t>
             </a:fld>
             <a:endParaRPr lang="en-US"/>
           </a:p>
@@ -4128,7 +4128,7 @@
   <p:clrMapOvr>
     <a:masterClrMapping/>
   </p:clrMapOvr>
-  <p:transition xmlns:p14="http://schemas.microsoft.com/office/powerpoint/2010/main" spd="slow">
+  <p:transition spd="slow">
     <p:cover/>
   </p:transition>
 </p:sldLayout>
@@ -4386,7 +4386,7 @@
           <a:p>
             <a:fld id="{BFB53563-A106-D843-82FC-7831B09AC79E}" type="datetime1">
               <a:rPr lang="en-US" smtClean="0"/>
-              <a:t>12/20/13</a:t>
+              <a:t>12/20/2013</a:t>
             </a:fld>
             <a:endParaRPr lang="en-US"/>
           </a:p>
@@ -4550,7 +4550,7 @@
   <p:clrMapOvr>
     <a:masterClrMapping/>
   </p:clrMapOvr>
-  <p:transition xmlns:p14="http://schemas.microsoft.com/office/powerpoint/2010/main" spd="slow">
+  <p:transition spd="slow">
     <p:cover/>
   </p:transition>
 </p:sldLayout>
@@ -4751,7 +4751,7 @@
           <a:p>
             <a:fld id="{D04D55B6-C890-CF41-B72A-159C40EC68CC}" type="datetime1">
               <a:rPr lang="en-US" smtClean="0"/>
-              <a:t>12/20/13</a:t>
+              <a:t>12/20/2013</a:t>
             </a:fld>
             <a:endParaRPr lang="en-US"/>
           </a:p>
@@ -4808,7 +4808,7 @@
   <p:clrMapOvr>
     <a:masterClrMapping/>
   </p:clrMapOvr>
-  <p:transition xmlns:p14="http://schemas.microsoft.com/office/powerpoint/2010/main" spd="slow">
+  <p:transition spd="slow">
     <p:cover/>
   </p:transition>
 </p:sldLayout>
@@ -4978,7 +4978,7 @@
           <a:p>
             <a:fld id="{667EDB12-2D5F-DB49-8259-2549448ED530}" type="datetime1">
               <a:rPr lang="en-US" smtClean="0"/>
-              <a:t>12/20/13</a:t>
+              <a:t>12/20/2013</a:t>
             </a:fld>
             <a:endParaRPr lang="en-US" dirty="0"/>
           </a:p>
@@ -5152,7 +5152,7 @@
   <p:clrMapOvr>
     <a:masterClrMapping/>
   </p:clrMapOvr>
-  <p:transition xmlns:p14="http://schemas.microsoft.com/office/powerpoint/2010/main" spd="slow">
+  <p:transition spd="slow">
     <p:cover/>
   </p:transition>
 </p:sldLayout>
@@ -5327,7 +5327,7 @@
           <a:p>
             <a:fld id="{2B05BE63-C29B-FE40-87E8-CF7439474E99}" type="datetime1">
               <a:rPr lang="en-US" smtClean="0"/>
-              <a:t>12/20/13</a:t>
+              <a:t>12/20/2013</a:t>
             </a:fld>
             <a:endParaRPr lang="en-US"/>
           </a:p>
@@ -5420,7 +5420,7 @@
   <p:clrMapOvr>
     <a:masterClrMapping/>
   </p:clrMapOvr>
-  <p:transition xmlns:p14="http://schemas.microsoft.com/office/powerpoint/2010/main" spd="slow">
+  <p:transition spd="slow">
     <p:cover/>
   </p:transition>
 </p:sldLayout>
@@ -5595,7 +5595,7 @@
           <a:p>
             <a:fld id="{DDB99DB2-2858-E442-9C99-3763198C6916}" type="datetime1">
               <a:rPr lang="en-US" smtClean="0"/>
-              <a:t>12/20/13</a:t>
+              <a:t>12/20/2013</a:t>
             </a:fld>
             <a:endParaRPr lang="en-US"/>
           </a:p>
@@ -5819,7 +5819,7 @@
   <p:clrMapOvr>
     <a:masterClrMapping/>
   </p:clrMapOvr>
-  <p:transition xmlns:p14="http://schemas.microsoft.com/office/powerpoint/2010/main" spd="slow">
+  <p:transition spd="slow">
     <p:cover/>
   </p:transition>
 </p:sldLayout>
@@ -6026,7 +6026,7 @@
           <a:p>
             <a:fld id="{E28FBF28-FB30-4A4B-9C23-9F4E3A920EF8}" type="datetime1">
               <a:rPr lang="en-US" smtClean="0"/>
-              <a:t>12/20/13</a:t>
+              <a:t>12/20/2013</a:t>
             </a:fld>
             <a:endParaRPr lang="en-US"/>
           </a:p>
@@ -6363,7 +6363,7 @@
   <p:clrMapOvr>
     <a:masterClrMapping/>
   </p:clrMapOvr>
-  <p:transition xmlns:p14="http://schemas.microsoft.com/office/powerpoint/2010/main" spd="slow">
+  <p:transition spd="slow">
     <p:cover/>
   </p:transition>
 </p:sldLayout>
@@ -6622,7 +6622,7 @@
           <a:p>
             <a:fld id="{D42FC1FF-75C8-5643-818E-6E07DD5DD3BD}" type="datetime1">
               <a:rPr lang="en-US" smtClean="0"/>
-              <a:t>12/20/13</a:t>
+              <a:t>12/20/2013</a:t>
             </a:fld>
             <a:endParaRPr lang="en-US"/>
           </a:p>
@@ -6779,7 +6779,7 @@
   <p:clrMapOvr>
     <a:masterClrMapping/>
   </p:clrMapOvr>
-  <p:transition xmlns:p14="http://schemas.microsoft.com/office/powerpoint/2010/main" spd="slow">
+  <p:transition spd="slow">
     <p:cover/>
   </p:transition>
 </p:sldLayout>
@@ -7149,7 +7149,7 @@
           <a:p>
             <a:fld id="{9958773F-B5DC-7641-8F13-C3ABD018624C}" type="datetime1">
               <a:rPr lang="en-US" smtClean="0"/>
-              <a:t>12/20/13</a:t>
+              <a:t>12/20/2013</a:t>
             </a:fld>
             <a:endParaRPr lang="en-US"/>
           </a:p>
@@ -7241,7 +7241,7 @@
   <p:clrMapOvr>
     <a:masterClrMapping/>
   </p:clrMapOvr>
-  <p:transition xmlns:p14="http://schemas.microsoft.com/office/powerpoint/2010/main" spd="slow">
+  <p:transition spd="slow">
     <p:cover/>
   </p:transition>
 </p:sldLayout>
@@ -7564,7 +7564,7 @@
           <a:p>
             <a:fld id="{9D6F9508-5B47-3945-BE34-44514B3C5056}" type="datetime1">
               <a:rPr lang="en-US" smtClean="0"/>
-              <a:t>12/20/13</a:t>
+              <a:t>12/20/2013</a:t>
             </a:fld>
             <a:endParaRPr lang="en-US"/>
           </a:p>
@@ -7814,7 +7814,7 @@
   <p:clrMapOvr>
     <a:masterClrMapping/>
   </p:clrMapOvr>
-  <p:transition xmlns:p14="http://schemas.microsoft.com/office/powerpoint/2010/main" spd="slow">
+  <p:transition spd="slow">
     <p:cover/>
   </p:transition>
 </p:sldLayout>
@@ -8005,7 +8005,7 @@
           <a:p>
             <a:fld id="{39012141-1B6B-B148-92FB-E490306E90E8}" type="datetime1">
               <a:rPr lang="en-US" smtClean="0"/>
-              <a:t>12/20/13</a:t>
+              <a:t>12/20/2013</a:t>
             </a:fld>
             <a:endParaRPr lang="en-US"/>
           </a:p>
@@ -8235,7 +8235,7 @@
   <p:clrMapOvr>
     <a:masterClrMapping/>
   </p:clrMapOvr>
-  <p:transition xmlns:p14="http://schemas.microsoft.com/office/powerpoint/2010/main" spd="slow">
+  <p:transition spd="slow">
     <p:cover/>
   </p:transition>
 </p:sldLayout>
@@ -8467,7 +8467,7 @@
           <a:p>
             <a:fld id="{B8495391-864C-6F46-86D4-FF96729AE3C8}" type="datetime1">
               <a:rPr lang="en-US" smtClean="0"/>
-              <a:t>12/20/13</a:t>
+              <a:t>12/20/2013</a:t>
             </a:fld>
             <a:endParaRPr lang="en-US"/>
           </a:p>
@@ -8698,7 +8698,7 @@
   <p:clrMapOvr>
     <a:masterClrMapping/>
   </p:clrMapOvr>
-  <p:transition xmlns:p14="http://schemas.microsoft.com/office/powerpoint/2010/main" spd="slow">
+  <p:transition spd="slow">
     <p:cover/>
   </p:transition>
 </p:sldLayout>
@@ -8857,7 +8857,7 @@
           <a:p>
             <a:fld id="{60B3BE82-0AD4-FE45-9928-624E950C4C34}" type="datetime1">
               <a:rPr lang="en-US" smtClean="0"/>
-              <a:t>12/20/13</a:t>
+              <a:t>12/20/2013</a:t>
             </a:fld>
             <a:endParaRPr lang="en-US"/>
           </a:p>
@@ -8969,7 +8969,7 @@
     <p:sldLayoutId id="2147483813" r:id="rId19"/>
     <p:sldLayoutId id="2147483814" r:id="rId20"/>
   </p:sldLayoutIdLst>
-  <p:transition xmlns:p14="http://schemas.microsoft.com/office/powerpoint/2010/main" spd="slow">
+  <p:transition spd="slow">
     <p:cover/>
   </p:transition>
   <p:hf hdr="0"/>
@@ -9382,7 +9382,7 @@
   <p:clrMapOvr>
     <a:masterClrMapping/>
   </p:clrMapOvr>
-  <p:transition xmlns:p14="http://schemas.microsoft.com/office/powerpoint/2010/main" spd="slow">
+  <p:transition spd="slow">
     <p:cover/>
   </p:transition>
 </p:sld>
@@ -9538,7 +9538,7 @@
           <a:p>
             <a:fld id="{D1C2397D-EF0C-644E-BBB4-32632CB7A862}" type="datetime1">
               <a:rPr lang="en-US" smtClean="0"/>
-              <a:t>12/20/13</a:t>
+              <a:t>12/20/2013</a:t>
             </a:fld>
             <a:endParaRPr lang="en-US"/>
           </a:p>
@@ -9600,7 +9600,7 @@
   <p:clrMapOvr>
     <a:masterClrMapping/>
   </p:clrMapOvr>
-  <p:transition xmlns:p14="http://schemas.microsoft.com/office/powerpoint/2010/main" spd="slow">
+  <p:transition spd="slow">
     <p:cover/>
   </p:transition>
 </p:sld>
@@ -9682,7 +9682,7 @@
           <a:p>
             <a:fld id="{667EDB12-2D5F-DB49-8259-2549448ED530}" type="datetime1">
               <a:rPr lang="en-US" smtClean="0"/>
-              <a:t>12/20/13</a:t>
+              <a:t>12/20/2013</a:t>
             </a:fld>
             <a:endParaRPr lang="en-US" dirty="0"/>
           </a:p>
@@ -9744,7 +9744,7 @@
   <p:clrMapOvr>
     <a:masterClrMapping/>
   </p:clrMapOvr>
-  <p:transition xmlns:p14="http://schemas.microsoft.com/office/powerpoint/2010/main" spd="slow">
+  <p:transition spd="slow">
     <p:cover/>
   </p:transition>
 </p:sld>
@@ -9826,7 +9826,7 @@
           <a:p>
             <a:fld id="{667EDB12-2D5F-DB49-8259-2549448ED530}" type="datetime1">
               <a:rPr lang="en-US" smtClean="0"/>
-              <a:t>12/20/13</a:t>
+              <a:t>12/20/2013</a:t>
             </a:fld>
             <a:endParaRPr lang="en-US" dirty="0"/>
           </a:p>
@@ -9888,7 +9888,7 @@
   <p:clrMapOvr>
     <a:masterClrMapping/>
   </p:clrMapOvr>
-  <p:transition xmlns:p14="http://schemas.microsoft.com/office/powerpoint/2010/main" spd="slow">
+  <p:transition spd="slow">
     <p:cover/>
   </p:transition>
 </p:sld>
@@ -9957,7 +9957,7 @@
           <a:p>
             <a:fld id="{AE468B07-2834-D44B-92D6-133E608A3FCF}" type="datetime1">
               <a:rPr lang="en-US" smtClean="0"/>
-              <a:t>12/20/13</a:t>
+              <a:t>12/20/2013</a:t>
             </a:fld>
             <a:endParaRPr lang="en-US"/>
           </a:p>
@@ -10019,7 +10019,7 @@
   <p:clrMapOvr>
     <a:masterClrMapping/>
   </p:clrMapOvr>
-  <p:transition xmlns:p14="http://schemas.microsoft.com/office/powerpoint/2010/main" spd="slow">
+  <p:transition spd="slow">
     <p:cover/>
   </p:transition>
 </p:sld>
@@ -10158,7 +10158,7 @@
           <a:p>
             <a:fld id="{15DA9C0E-E4F0-1742-980D-A7CA3FBFE5BA}" type="datetime1">
               <a:rPr lang="en-US" smtClean="0"/>
-              <a:t>12/20/13</a:t>
+              <a:t>12/20/2013</a:t>
             </a:fld>
             <a:endParaRPr lang="en-US"/>
           </a:p>
@@ -10220,7 +10220,7 @@
   <p:clrMapOvr>
     <a:masterClrMapping/>
   </p:clrMapOvr>
-  <p:transition xmlns:p14="http://schemas.microsoft.com/office/powerpoint/2010/main" spd="slow">
+  <p:transition spd="slow">
     <p:cover/>
   </p:transition>
 </p:sld>
@@ -10260,11 +10260,7 @@
           <a:p>
             <a:r>
               <a:rPr lang="en-US" dirty="0" smtClean="0"/>
-              <a:t>Name </a:t>
-            </a:r>
-            <a:r>
-              <a:rPr lang="en-US" dirty="0" smtClean="0"/>
-              <a:t>and Slogan</a:t>
+              <a:t>Name and Slogan</a:t>
             </a:r>
             <a:endParaRPr lang="en-US" dirty="0"/>
           </a:p>
@@ -10360,7 +10356,7 @@
           <a:p>
             <a:fld id="{858C90D6-F097-D548-A030-C5CF669933C0}" type="datetime1">
               <a:rPr lang="en-US" smtClean="0"/>
-              <a:t>12/20/13</a:t>
+              <a:t>12/20/2013</a:t>
             </a:fld>
             <a:endParaRPr lang="en-US"/>
           </a:p>
@@ -10422,7 +10418,7 @@
   <p:clrMapOvr>
     <a:masterClrMapping/>
   </p:clrMapOvr>
-  <p:transition xmlns:p14="http://schemas.microsoft.com/office/powerpoint/2010/main" spd="slow">
+  <p:transition spd="slow">
     <p:cover/>
   </p:transition>
 </p:sld>
@@ -10462,11 +10458,7 @@
           <a:p>
             <a:r>
               <a:rPr lang="en-US" dirty="0" smtClean="0"/>
-              <a:t>Initial </a:t>
-            </a:r>
-            <a:r>
-              <a:rPr lang="en-US" dirty="0" smtClean="0"/>
-              <a:t>business Model</a:t>
+              <a:t>Initial business Model</a:t>
             </a:r>
             <a:endParaRPr lang="en-US" dirty="0"/>
           </a:p>
@@ -10514,7 +10506,7 @@
           <a:p>
             <a:fld id="{BB6F1F77-9385-DD4D-BA22-4ADBE17ABB47}" type="datetime1">
               <a:rPr lang="en-US" smtClean="0"/>
-              <a:t>12/20/13</a:t>
+              <a:t>12/20/2013</a:t>
             </a:fld>
             <a:endParaRPr lang="en-US"/>
           </a:p>
@@ -10576,7 +10568,7 @@
   <p:clrMapOvr>
     <a:masterClrMapping/>
   </p:clrMapOvr>
-  <p:transition xmlns:p14="http://schemas.microsoft.com/office/powerpoint/2010/main" spd="slow">
+  <p:transition spd="slow">
     <p:cover/>
   </p:transition>
 </p:sld>
@@ -10658,7 +10650,7 @@
           <a:p>
             <a:fld id="{667EDB12-2D5F-DB49-8259-2549448ED530}" type="datetime1">
               <a:rPr lang="en-US" smtClean="0"/>
-              <a:t>12/20/13</a:t>
+              <a:t>12/20/2013</a:t>
             </a:fld>
             <a:endParaRPr lang="en-US" dirty="0"/>
           </a:p>
@@ -10720,9 +10712,16 @@
   <p:clrMapOvr>
     <a:masterClrMapping/>
   </p:clrMapOvr>
-  <p:transition xmlns:p14="http://schemas.microsoft.com/office/powerpoint/2010/main" spd="slow">
+  <p:transition spd="slow">
     <p:cover/>
   </p:transition>
+  <p:timing>
+    <p:tnLst>
+      <p:par>
+        <p:cTn id="1" dur="indefinite" restart="never" nodeType="tmRoot"/>
+      </p:par>
+    </p:tnLst>
+  </p:timing>
 </p:sld>
 </file>
 
@@ -10769,43 +10768,53 @@
           </a:p>
         </p:txBody>
       </p:sp>
-      <p:sp>
-        <p:nvSpPr>
-          <p:cNvPr id="3" name="Content Placeholder 2"/>
-          <p:cNvSpPr>
-            <a:spLocks noGrp="1"/>
-          </p:cNvSpPr>
+      <p:pic>
+        <p:nvPicPr>
+          <p:cNvPr id="7" name="Content Placeholder 6"/>
+          <p:cNvPicPr>
+            <a:picLocks noGrp="1" noChangeAspect="1"/>
+          </p:cNvPicPr>
           <p:nvPr>
             <p:ph idx="1"/>
           </p:nvPr>
+        </p:nvPicPr>
+        <p:blipFill>
+          <a:blip r:embed="rId2">
+            <a:extLst>
+              <a:ext uri="{28A0092B-C50C-407E-A947-70E740481C1C}">
+                <a14:useLocalDpi xmlns:a14="http://schemas.microsoft.com/office/drawing/2010/main" val="0"/>
+              </a:ext>
+            </a:extLst>
+          </a:blip>
+          <a:stretch>
+            <a:fillRect/>
+          </a:stretch>
+        </p:blipFill>
+        <p:spPr>
+          <a:xfrm>
+            <a:off x="-178158" y="2667000"/>
+            <a:ext cx="9518051" cy="2819400"/>
+          </a:xfrm>
+        </p:spPr>
+      </p:pic>
+      <p:sp>
+        <p:nvSpPr>
+          <p:cNvPr id="4" name="Date Placeholder 3"/>
+          <p:cNvSpPr>
+            <a:spLocks noGrp="1"/>
+          </p:cNvSpPr>
+          <p:nvPr>
+            <p:ph type="dt" sz="half" idx="10"/>
+          </p:nvPr>
         </p:nvSpPr>
         <p:spPr/>
         <p:txBody>
           <a:bodyPr/>
           <a:lstStyle/>
           <a:p>
-            <a:endParaRPr lang="en-US"/>
-          </a:p>
-        </p:txBody>
-      </p:sp>
-      <p:sp>
-        <p:nvSpPr>
-          <p:cNvPr id="4" name="Date Placeholder 3"/>
-          <p:cNvSpPr>
-            <a:spLocks noGrp="1"/>
-          </p:cNvSpPr>
-          <p:nvPr>
-            <p:ph type="dt" sz="half" idx="10"/>
-          </p:nvPr>
-        </p:nvSpPr>
-        <p:spPr/>
-        <p:txBody>
-          <a:bodyPr/>
-          <a:lstStyle/>
-          <a:p>
             <a:fld id="{93434EE5-5336-D946-A3D5-DD71A0B5A1C3}" type="datetime1">
               <a:rPr lang="en-US" smtClean="0"/>
-              <a:t>12/20/13</a:t>
+              <a:t>12/20/2013</a:t>
             </a:fld>
             <a:endParaRPr lang="en-US"/>
           </a:p>
@@ -10867,9 +10876,16 @@
   <p:clrMapOvr>
     <a:masterClrMapping/>
   </p:clrMapOvr>
-  <p:transition xmlns:p14="http://schemas.microsoft.com/office/powerpoint/2010/main" spd="slow">
+  <p:transition spd="slow">
     <p:cover/>
   </p:transition>
+  <p:timing>
+    <p:tnLst>
+      <p:par>
+        <p:cTn id="1" dur="indefinite" restart="never" nodeType="tmRoot"/>
+      </p:par>
+    </p:tnLst>
+  </p:timing>
 </p:sld>
 </file>
 
@@ -10989,7 +11005,7 @@
           <a:p>
             <a:fld id="{137616F2-F872-2847-B82E-D67C6AF4A7F8}" type="datetime1">
               <a:rPr lang="en-US" smtClean="0"/>
-              <a:t>12/20/13</a:t>
+              <a:t>12/20/2013</a:t>
             </a:fld>
             <a:endParaRPr lang="en-US"/>
           </a:p>
@@ -11051,9 +11067,16 @@
   <p:clrMapOvr>
     <a:masterClrMapping/>
   </p:clrMapOvr>
-  <p:transition xmlns:p14="http://schemas.microsoft.com/office/powerpoint/2010/main" spd="slow">
+  <p:transition spd="slow">
     <p:cover/>
   </p:transition>
+  <p:timing>
+    <p:tnLst>
+      <p:par>
+        <p:cTn id="1" dur="indefinite" restart="never" nodeType="tmRoot"/>
+      </p:par>
+    </p:tnLst>
+  </p:timing>
 </p:sld>
 </file>
 
@@ -11186,7 +11209,7 @@
           <a:p>
             <a:fld id="{98DB7177-A409-F741-9A64-3CE584965EBE}" type="datetime1">
               <a:rPr lang="en-US" smtClean="0"/>
-              <a:t>12/20/13</a:t>
+              <a:t>12/20/2013</a:t>
             </a:fld>
             <a:endParaRPr lang="en-US"/>
           </a:p>
@@ -11248,9 +11271,16 @@
   <p:clrMapOvr>
     <a:masterClrMapping/>
   </p:clrMapOvr>
-  <p:transition xmlns:p14="http://schemas.microsoft.com/office/powerpoint/2010/main" spd="slow">
+  <p:transition spd="slow">
     <p:cover/>
   </p:transition>
+  <p:timing>
+    <p:tnLst>
+      <p:par>
+        <p:cTn id="1" dur="indefinite" restart="never" nodeType="tmRoot"/>
+      </p:par>
+    </p:tnLst>
+  </p:timing>
 </p:sld>
 </file>
 
@@ -11457,7 +11487,7 @@
           <a:p>
             <a:fld id="{4986A14E-4111-6641-928F-77CC50C30EA2}" type="datetime1">
               <a:rPr lang="en-US" smtClean="0"/>
-              <a:t>12/20/13</a:t>
+              <a:t>12/20/2013</a:t>
             </a:fld>
             <a:endParaRPr lang="en-US"/>
           </a:p>
@@ -11519,7 +11549,7 @@
   <p:clrMapOvr>
     <a:masterClrMapping/>
   </p:clrMapOvr>
-  <p:transition xmlns:p14="http://schemas.microsoft.com/office/powerpoint/2010/main" spd="slow">
+  <p:transition spd="slow">
     <p:cover/>
   </p:transition>
 </p:sld>

</xml_diff>

<commit_message>
Update slide & Layout design
</commit_message>
<xml_diff>
--- a/References/RUSH GAME.pptx
+++ b/References/RUSH GAME.pptx
@@ -10285,8 +10285,21 @@
           <a:p>
             <a:r>
               <a:rPr lang="en-US" dirty="0" smtClean="0"/>
-              <a:t>RUSH GAME – Run for your dinner</a:t>
-            </a:r>
+              <a:t>RUSH GAME – </a:t>
+            </a:r>
+            <a:r>
+              <a:rPr lang="en-US" dirty="0" smtClean="0"/>
+              <a:t>The Ultimate </a:t>
+            </a:r>
+            <a:r>
+              <a:rPr lang="en-US" dirty="0" err="1" smtClean="0"/>
+              <a:t>Platformer</a:t>
+            </a:r>
+            <a:r>
+              <a:rPr lang="en-US" dirty="0" smtClean="0"/>
+              <a:t> Racing Game</a:t>
+            </a:r>
+            <a:endParaRPr lang="en-US" dirty="0" smtClean="0"/>
           </a:p>
           <a:p>
             <a:r>
@@ -10480,11 +10493,15 @@
           <a:lstStyle/>
           <a:p>
             <a:r>
-              <a:rPr lang="en-US" dirty="0"/>
-              <a:t>target users/country/phone, competitors in both android market and apple app store, and pricing/marketing strategy </a:t>
-            </a:r>
-          </a:p>
-          <a:p>
+              <a:rPr lang="en-US" dirty="0" smtClean="0"/>
+              <a:t>Store for Item &amp; Model</a:t>
+            </a:r>
+          </a:p>
+          <a:p>
+            <a:r>
+              <a:rPr lang="en-US" dirty="0" smtClean="0"/>
+              <a:t>Map for sale</a:t>
+            </a:r>
             <a:endParaRPr lang="en-US" dirty="0"/>
           </a:p>
         </p:txBody>
@@ -10629,7 +10646,13 @@
           <a:bodyPr/>
           <a:lstStyle/>
           <a:p>
-            <a:endParaRPr lang="en-US"/>
+            <a:r>
+              <a:rPr lang="en-US" dirty="0" smtClean="0">
+                <a:hlinkClick r:id="rId2" action="ppaction://hlinkfile"/>
+              </a:rPr>
+              <a:t>Layout</a:t>
+            </a:r>
+            <a:endParaRPr lang="en-US" dirty="0"/>
           </a:p>
         </p:txBody>
       </p:sp>
@@ -11376,7 +11399,19 @@
               <a:rPr lang="en-US" dirty="0" smtClean="0">
                 <a:sym typeface="Wingdings" panose="05000000000000000000" pitchFamily="2" charset="2"/>
               </a:rPr>
-              <a:t>Work Plan (Checkpoint 1 has obtained)</a:t>
+              <a:t>Work Plan (Checkpoint 1 has </a:t>
+            </a:r>
+            <a:r>
+              <a:rPr lang="en-US" dirty="0" smtClean="0">
+                <a:sym typeface="Wingdings" panose="05000000000000000000" pitchFamily="2" charset="2"/>
+              </a:rPr>
+              <a:t>been obtained</a:t>
+            </a:r>
+            <a:r>
+              <a:rPr lang="en-US" dirty="0" smtClean="0">
+                <a:sym typeface="Wingdings" panose="05000000000000000000" pitchFamily="2" charset="2"/>
+              </a:rPr>
+              <a:t>)</a:t>
             </a:r>
           </a:p>
           <a:p>

</xml_diff>